<commit_message>
lokalisierbarkeit der gui aufgenommen
</commit_message>
<xml_diff>
--- a/Präsentation/Funktionsweise.pptx
+++ b/Präsentation/Funktionsweise.pptx
@@ -9783,8 +9783,13 @@
             <a:pPr lvl="1"/>
             <a:r>
               <a:rPr lang="de-DE" dirty="0" smtClean="0"/>
-              <a:t>Als Text</a:t>
-            </a:r>
+              <a:t>Als </a:t>
+            </a:r>
+            <a:r>
+              <a:rPr lang="de-DE" dirty="0" smtClean="0"/>
+              <a:t>lokalisierter Text</a:t>
+            </a:r>
+            <a:endParaRPr lang="de-DE" dirty="0" smtClean="0"/>
           </a:p>
           <a:p>
             <a:pPr lvl="1"/>

</xml_diff>